<commit_message>
Update diagrams and developer guide
</commit_message>
<xml_diff>
--- a/docs/diagrams/ModelComponentClassDiagram.pptx
+++ b/docs/diagrams/ModelComponentClassDiagram.pptx
@@ -208,7 +208,7 @@
           <a:p>
             <a:fld id="{F5CC4B3F-88C1-4FFA-B1B6-F41C21DC6924}" type="datetimeFigureOut">
               <a:rPr lang="en-US" smtClean="0"/>
-              <a:t>3/27/2018</a:t>
+              <a:t>4/2/2018</a:t>
             </a:fld>
             <a:endParaRPr lang="en-US"/>
           </a:p>
@@ -654,7 +654,7 @@
           <a:p>
             <a:fld id="{78C97017-6FC3-485B-9764-EAC9E56C1D49}" type="datetimeFigureOut">
               <a:rPr lang="en-US" smtClean="0"/>
-              <a:t>3/27/2018</a:t>
+              <a:t>4/2/2018</a:t>
             </a:fld>
             <a:endParaRPr lang="en-US"/>
           </a:p>
@@ -822,7 +822,7 @@
           <a:p>
             <a:fld id="{78C97017-6FC3-485B-9764-EAC9E56C1D49}" type="datetimeFigureOut">
               <a:rPr lang="en-US" smtClean="0"/>
-              <a:t>3/27/2018</a:t>
+              <a:t>4/2/2018</a:t>
             </a:fld>
             <a:endParaRPr lang="en-US"/>
           </a:p>
@@ -1000,7 +1000,7 @@
           <a:p>
             <a:fld id="{78C97017-6FC3-485B-9764-EAC9E56C1D49}" type="datetimeFigureOut">
               <a:rPr lang="en-US" smtClean="0"/>
-              <a:t>3/27/2018</a:t>
+              <a:t>4/2/2018</a:t>
             </a:fld>
             <a:endParaRPr lang="en-US"/>
           </a:p>
@@ -1168,7 +1168,7 @@
           <a:p>
             <a:fld id="{78C97017-6FC3-485B-9764-EAC9E56C1D49}" type="datetimeFigureOut">
               <a:rPr lang="en-US" smtClean="0"/>
-              <a:t>3/27/2018</a:t>
+              <a:t>4/2/2018</a:t>
             </a:fld>
             <a:endParaRPr lang="en-US"/>
           </a:p>
@@ -1413,7 +1413,7 @@
           <a:p>
             <a:fld id="{78C97017-6FC3-485B-9764-EAC9E56C1D49}" type="datetimeFigureOut">
               <a:rPr lang="en-US" smtClean="0"/>
-              <a:t>3/27/2018</a:t>
+              <a:t>4/2/2018</a:t>
             </a:fld>
             <a:endParaRPr lang="en-US"/>
           </a:p>
@@ -1698,7 +1698,7 @@
           <a:p>
             <a:fld id="{78C97017-6FC3-485B-9764-EAC9E56C1D49}" type="datetimeFigureOut">
               <a:rPr lang="en-US" smtClean="0"/>
-              <a:t>3/27/2018</a:t>
+              <a:t>4/2/2018</a:t>
             </a:fld>
             <a:endParaRPr lang="en-US"/>
           </a:p>
@@ -2117,7 +2117,7 @@
           <a:p>
             <a:fld id="{78C97017-6FC3-485B-9764-EAC9E56C1D49}" type="datetimeFigureOut">
               <a:rPr lang="en-US" smtClean="0"/>
-              <a:t>3/27/2018</a:t>
+              <a:t>4/2/2018</a:t>
             </a:fld>
             <a:endParaRPr lang="en-US"/>
           </a:p>
@@ -2234,7 +2234,7 @@
           <a:p>
             <a:fld id="{78C97017-6FC3-485B-9764-EAC9E56C1D49}" type="datetimeFigureOut">
               <a:rPr lang="en-US" smtClean="0"/>
-              <a:t>3/27/2018</a:t>
+              <a:t>4/2/2018</a:t>
             </a:fld>
             <a:endParaRPr lang="en-US"/>
           </a:p>
@@ -2329,7 +2329,7 @@
           <a:p>
             <a:fld id="{78C97017-6FC3-485B-9764-EAC9E56C1D49}" type="datetimeFigureOut">
               <a:rPr lang="en-US" smtClean="0"/>
-              <a:t>3/27/2018</a:t>
+              <a:t>4/2/2018</a:t>
             </a:fld>
             <a:endParaRPr lang="en-US"/>
           </a:p>
@@ -2604,7 +2604,7 @@
           <a:p>
             <a:fld id="{78C97017-6FC3-485B-9764-EAC9E56C1D49}" type="datetimeFigureOut">
               <a:rPr lang="en-US" smtClean="0"/>
-              <a:t>3/27/2018</a:t>
+              <a:t>4/2/2018</a:t>
             </a:fld>
             <a:endParaRPr lang="en-US"/>
           </a:p>
@@ -2856,7 +2856,7 @@
           <a:p>
             <a:fld id="{78C97017-6FC3-485B-9764-EAC9E56C1D49}" type="datetimeFigureOut">
               <a:rPr lang="en-US" smtClean="0"/>
-              <a:t>3/27/2018</a:t>
+              <a:t>4/2/2018</a:t>
             </a:fld>
             <a:endParaRPr lang="en-US"/>
           </a:p>
@@ -3067,7 +3067,7 @@
           <a:p>
             <a:fld id="{78C97017-6FC3-485B-9764-EAC9E56C1D49}" type="datetimeFigureOut">
               <a:rPr lang="en-US" smtClean="0"/>
-              <a:t>3/27/2018</a:t>
+              <a:t>4/2/2018</a:t>
             </a:fld>
             <a:endParaRPr lang="en-US"/>
           </a:p>
@@ -3450,8 +3450,8 @@
         </p:nvSpPr>
         <p:spPr>
           <a:xfrm>
-            <a:off x="1066800" y="1541452"/>
-            <a:ext cx="7772400" cy="4003988"/>
+            <a:off x="1143000" y="685800"/>
+            <a:ext cx="7467600" cy="5348848"/>
           </a:xfrm>
           <a:prstGeom prst="roundRect">
             <a:avLst>
@@ -3749,8 +3749,8 @@
         </p:nvCxnSpPr>
         <p:spPr>
           <a:xfrm>
-            <a:off x="2656370" y="3326536"/>
-            <a:ext cx="220810" cy="5284"/>
+            <a:off x="2649644" y="3331820"/>
+            <a:ext cx="227536" cy="0"/>
           </a:xfrm>
           <a:prstGeom prst="straightConnector1">
             <a:avLst/>
@@ -3871,7 +3871,7 @@
         </p:nvSpPr>
         <p:spPr>
           <a:xfrm>
-            <a:off x="2420322" y="3239846"/>
+            <a:off x="2413596" y="3245130"/>
             <a:ext cx="236048" cy="173380"/>
           </a:xfrm>
           <a:prstGeom prst="flowChartDecision">
@@ -3976,8 +3976,8 @@
         </p:nvCxnSpPr>
         <p:spPr>
           <a:xfrm>
-            <a:off x="2658680" y="2795516"/>
-            <a:ext cx="136120" cy="5284"/>
+            <a:off x="2649644" y="2800800"/>
+            <a:ext cx="145156" cy="0"/>
           </a:xfrm>
           <a:prstGeom prst="straightConnector1">
             <a:avLst/>
@@ -4014,7 +4014,7 @@
         </p:nvSpPr>
         <p:spPr>
           <a:xfrm>
-            <a:off x="2422632" y="2708826"/>
+            <a:off x="2413596" y="2714110"/>
             <a:ext cx="236048" cy="173380"/>
           </a:xfrm>
           <a:prstGeom prst="flowChartDecision">
@@ -4059,8 +4059,8 @@
         </p:nvSpPr>
         <p:spPr>
           <a:xfrm>
-            <a:off x="4487017" y="2847371"/>
-            <a:ext cx="1156969" cy="346760"/>
+            <a:off x="4486255" y="1808956"/>
+            <a:ext cx="1156969" cy="337889"/>
           </a:xfrm>
           <a:prstGeom prst="rect">
             <a:avLst/>
@@ -4158,18 +4158,21 @@
         <p:nvCxnSpPr>
           <p:cNvPr id="30" name="Elbow Connector 29"/>
           <p:cNvCxnSpPr>
+            <a:cxnSpLocks/>
             <a:stCxn id="51" idx="3"/>
             <a:endCxn id="49" idx="1"/>
           </p:cNvCxnSpPr>
           <p:nvPr/>
         </p:nvCxnSpPr>
         <p:spPr>
-          <a:xfrm>
-            <a:off x="4220351" y="2760681"/>
-            <a:ext cx="266666" cy="260070"/>
+          <a:xfrm flipV="1">
+            <a:off x="4220351" y="1977901"/>
+            <a:ext cx="265904" cy="782780"/>
           </a:xfrm>
           <a:prstGeom prst="bentConnector3">
-            <a:avLst/>
+            <a:avLst>
+              <a:gd name="adj1" fmla="val 50000"/>
+            </a:avLst>
           </a:prstGeom>
           <a:ln w="19050">
             <a:solidFill>
@@ -4203,7 +4206,7 @@
         </p:nvSpPr>
         <p:spPr>
           <a:xfrm>
-            <a:off x="4477328" y="2280569"/>
+            <a:off x="4486256" y="3039290"/>
             <a:ext cx="1156969" cy="346760"/>
           </a:xfrm>
           <a:prstGeom prst="rect">
@@ -4261,9 +4264,9 @@
           <p:nvPr/>
         </p:nvCxnSpPr>
         <p:spPr>
-          <a:xfrm flipV="1">
-            <a:off x="4220351" y="2453949"/>
-            <a:ext cx="256977" cy="306732"/>
+          <a:xfrm>
+            <a:off x="4220351" y="2760681"/>
+            <a:ext cx="265905" cy="451989"/>
           </a:xfrm>
           <a:prstGeom prst="bentConnector3">
             <a:avLst>
@@ -4302,7 +4305,7 @@
         </p:nvSpPr>
         <p:spPr>
           <a:xfrm>
-            <a:off x="6271375" y="2858066"/>
+            <a:off x="5626744" y="1265780"/>
             <a:ext cx="750488" cy="346760"/>
           </a:xfrm>
           <a:prstGeom prst="rect">
@@ -4358,7 +4361,7 @@
         </p:nvSpPr>
         <p:spPr>
           <a:xfrm>
-            <a:off x="5643227" y="2943979"/>
+            <a:off x="5651752" y="1887279"/>
             <a:ext cx="236048" cy="173380"/>
           </a:xfrm>
           <a:prstGeom prst="flowChartDecision">
@@ -4391,7 +4394,7 @@
           <a:lstStyle/>
           <a:p>
             <a:pPr algn="ctr"/>
-            <a:endParaRPr lang="en-US" sz="1050"/>
+            <a:endParaRPr lang="en-US" sz="1050" dirty="0"/>
           </a:p>
         </p:txBody>
       </p:sp>
@@ -4401,16 +4404,16 @@
           <p:cNvCxnSpPr>
             <a:cxnSpLocks/>
             <a:stCxn id="63" idx="3"/>
-            <a:endCxn id="62" idx="1"/>
+            <a:endCxn id="62" idx="2"/>
           </p:cNvCxnSpPr>
           <p:nvPr/>
         </p:nvCxnSpPr>
         <p:spPr>
-          <a:xfrm>
-            <a:off x="5879275" y="3030669"/>
-            <a:ext cx="392100" cy="777"/>
-          </a:xfrm>
-          <a:prstGeom prst="bentConnector3">
+          <a:xfrm flipV="1">
+            <a:off x="5887800" y="1612540"/>
+            <a:ext cx="114188" cy="361429"/>
+          </a:xfrm>
+          <a:prstGeom prst="bentConnector2">
             <a:avLst/>
           </a:prstGeom>
           <a:ln w="19050">
@@ -4445,7 +4448,7 @@
         </p:nvSpPr>
         <p:spPr>
           <a:xfrm>
-            <a:off x="5336105" y="1809332"/>
+            <a:off x="4802167" y="2283567"/>
             <a:ext cx="483700" cy="346760"/>
           </a:xfrm>
           <a:prstGeom prst="rect">
@@ -4501,7 +4504,7 @@
         </p:nvSpPr>
         <p:spPr>
           <a:xfrm rot="16200000">
-            <a:off x="4921666" y="2066540"/>
+            <a:off x="4926189" y="2822409"/>
             <a:ext cx="236048" cy="173380"/>
           </a:xfrm>
           <a:prstGeom prst="flowChartDecision">
@@ -4538,47 +4541,6 @@
           </a:p>
         </p:txBody>
       </p:sp>
-      <p:cxnSp>
-        <p:nvCxnSpPr>
-          <p:cNvPr id="69" name="Elbow Connector 68"/>
-          <p:cNvCxnSpPr>
-            <a:stCxn id="68" idx="3"/>
-            <a:endCxn id="67" idx="1"/>
-          </p:cNvCxnSpPr>
-          <p:nvPr/>
-        </p:nvCxnSpPr>
-        <p:spPr>
-          <a:xfrm rot="5400000" flipH="1" flipV="1">
-            <a:off x="5161650" y="1860752"/>
-            <a:ext cx="52494" cy="296415"/>
-          </a:xfrm>
-          <a:prstGeom prst="bentConnector2">
-            <a:avLst/>
-          </a:prstGeom>
-          <a:ln w="19050">
-            <a:solidFill>
-              <a:srgbClr val="7030A0"/>
-            </a:solidFill>
-            <a:headEnd type="none" w="med" len="med"/>
-            <a:tailEnd type="arrow" w="med" len="med"/>
-          </a:ln>
-          <a:effectLst/>
-        </p:spPr>
-        <p:style>
-          <a:lnRef idx="1">
-            <a:schemeClr val="accent2"/>
-          </a:lnRef>
-          <a:fillRef idx="2">
-            <a:schemeClr val="accent2"/>
-          </a:fillRef>
-          <a:effectRef idx="1">
-            <a:schemeClr val="accent2"/>
-          </a:effectRef>
-          <a:fontRef idx="minor">
-            <a:schemeClr val="dk1"/>
-          </a:fontRef>
-        </p:style>
-      </p:cxnSp>
       <p:sp>
         <p:nvSpPr>
           <p:cNvPr id="76" name="Rectangle 8"/>
@@ -4587,7 +4549,7 @@
         </p:nvSpPr>
         <p:spPr>
           <a:xfrm>
-            <a:off x="7698042" y="2010338"/>
+            <a:off x="7006035" y="1653793"/>
             <a:ext cx="708186" cy="285783"/>
           </a:xfrm>
           <a:prstGeom prst="rect">
@@ -4643,7 +4605,7 @@
         </p:nvSpPr>
         <p:spPr>
           <a:xfrm>
-            <a:off x="7041947" y="2948201"/>
+            <a:off x="6392668" y="1352470"/>
             <a:ext cx="236048" cy="173380"/>
           </a:xfrm>
           <a:prstGeom prst="flowChartDecision">
@@ -4692,9 +4654,9 @@
           <p:nvPr/>
         </p:nvCxnSpPr>
         <p:spPr>
-          <a:xfrm flipV="1">
-            <a:off x="7277995" y="2153230"/>
-            <a:ext cx="420047" cy="881661"/>
+          <a:xfrm>
+            <a:off x="6628716" y="1439160"/>
+            <a:ext cx="377319" cy="357525"/>
           </a:xfrm>
           <a:prstGeom prst="bentConnector3">
             <a:avLst/>
@@ -4731,7 +4693,7 @@
         </p:nvSpPr>
         <p:spPr>
           <a:xfrm>
-            <a:off x="7698042" y="2333316"/>
+            <a:off x="7006035" y="1976771"/>
             <a:ext cx="708186" cy="285783"/>
           </a:xfrm>
           <a:prstGeom prst="rect">
@@ -4789,9 +4751,9 @@
           <p:nvPr/>
         </p:nvCxnSpPr>
         <p:spPr>
-          <a:xfrm flipV="1">
-            <a:off x="7277995" y="2476208"/>
-            <a:ext cx="420047" cy="558683"/>
+          <a:xfrm>
+            <a:off x="6628716" y="1439160"/>
+            <a:ext cx="377319" cy="680503"/>
           </a:xfrm>
           <a:prstGeom prst="bentConnector3">
             <a:avLst/>
@@ -4828,7 +4790,7 @@
         </p:nvSpPr>
         <p:spPr>
           <a:xfrm>
-            <a:off x="7698042" y="2656294"/>
+            <a:off x="7006035" y="2299749"/>
             <a:ext cx="708186" cy="285783"/>
           </a:xfrm>
           <a:prstGeom prst="rect">
@@ -4886,9 +4848,9 @@
           <p:nvPr/>
         </p:nvCxnSpPr>
         <p:spPr>
-          <a:xfrm flipV="1">
-            <a:off x="7277995" y="2799186"/>
-            <a:ext cx="420047" cy="235705"/>
+          <a:xfrm>
+            <a:off x="6628716" y="1439160"/>
+            <a:ext cx="377319" cy="1003481"/>
           </a:xfrm>
           <a:prstGeom prst="bentConnector3">
             <a:avLst/>
@@ -4925,7 +4887,7 @@
         </p:nvSpPr>
         <p:spPr>
           <a:xfrm>
-            <a:off x="7696460" y="1686389"/>
+            <a:off x="7004453" y="1329844"/>
             <a:ext cx="708186" cy="285783"/>
           </a:xfrm>
           <a:prstGeom prst="rect">
@@ -4983,9 +4945,9 @@
           <p:nvPr/>
         </p:nvCxnSpPr>
         <p:spPr>
-          <a:xfrm flipV="1">
-            <a:off x="7277995" y="1829281"/>
-            <a:ext cx="418465" cy="1205610"/>
+          <a:xfrm>
+            <a:off x="6628716" y="1439160"/>
+            <a:ext cx="375737" cy="33576"/>
           </a:xfrm>
           <a:prstGeom prst="bentConnector3">
             <a:avLst/>
@@ -5113,7 +5075,7 @@
         </p:nvSpPr>
         <p:spPr>
           <a:xfrm>
-            <a:off x="2660302" y="1806470"/>
+            <a:off x="2534078" y="1807204"/>
             <a:ext cx="1745073" cy="346760"/>
           </a:xfrm>
           <a:prstGeom prst="rect">
@@ -5183,8 +5145,8 @@
           <p:nvPr/>
         </p:nvSpPr>
         <p:spPr>
-          <a:xfrm rot="16200000">
-            <a:off x="6490833" y="2036001"/>
+          <a:xfrm>
+            <a:off x="3805190" y="1364163"/>
             <a:ext cx="881018" cy="261610"/>
           </a:xfrm>
           <a:prstGeom prst="rect">
@@ -5223,7 +5185,7 @@
         </p:nvSpPr>
         <p:spPr>
           <a:xfrm>
-            <a:off x="1886922" y="3786928"/>
+            <a:off x="1775434" y="4096607"/>
             <a:ext cx="1066800" cy="346760"/>
           </a:xfrm>
           <a:prstGeom prst="rect">
@@ -5297,8 +5259,8 @@
         </p:nvCxnSpPr>
         <p:spPr>
           <a:xfrm rot="16200000" flipH="1">
-            <a:off x="1505517" y="3578903"/>
-            <a:ext cx="378908" cy="383902"/>
+            <a:off x="1294934" y="3789486"/>
+            <a:ext cx="688587" cy="272414"/>
           </a:xfrm>
           <a:prstGeom prst="bentConnector2">
             <a:avLst/>
@@ -5333,18 +5295,20 @@
           <p:cNvPr id="50" name="Elbow Connector 49"/>
           <p:cNvCxnSpPr>
             <a:cxnSpLocks/>
-            <a:stCxn id="62" idx="0"/>
+            <a:stCxn id="78" idx="3"/>
             <a:endCxn id="57" idx="3"/>
           </p:cNvCxnSpPr>
           <p:nvPr/>
         </p:nvCxnSpPr>
         <p:spPr>
-          <a:xfrm rot="16200000" flipV="1">
-            <a:off x="5938400" y="2149847"/>
-            <a:ext cx="404117" cy="1012322"/>
-          </a:xfrm>
-          <a:prstGeom prst="bentConnector2">
-            <a:avLst/>
+          <a:xfrm flipH="1">
+            <a:off x="5643225" y="1439160"/>
+            <a:ext cx="985491" cy="1773510"/>
+          </a:xfrm>
+          <a:prstGeom prst="bentConnector3">
+            <a:avLst>
+              <a:gd name="adj1" fmla="val -18970"/>
+            </a:avLst>
           </a:prstGeom>
           <a:ln w="19050">
             <a:solidFill>
@@ -5378,7 +5342,7 @@
         </p:nvSpPr>
         <p:spPr>
           <a:xfrm>
-            <a:off x="4324972" y="2262554"/>
+            <a:off x="4309700" y="1762942"/>
             <a:ext cx="189257" cy="178683"/>
           </a:xfrm>
           <a:prstGeom prst="rect">
@@ -5417,7 +5381,7 @@
         </p:nvSpPr>
         <p:spPr>
           <a:xfrm>
-            <a:off x="4324972" y="2833101"/>
+            <a:off x="4323140" y="2978119"/>
             <a:ext cx="189257" cy="178683"/>
           </a:xfrm>
           <a:prstGeom prst="rect">
@@ -5450,13 +5414,91 @@
       </p:sp>
       <p:sp>
         <p:nvSpPr>
-          <p:cNvPr id="56" name="TextBox 55"/>
+          <p:cNvPr id="60" name="TextBox 59"/>
           <p:cNvSpPr txBox="1"/>
           <p:nvPr/>
         </p:nvSpPr>
         <p:spPr>
           <a:xfrm>
-            <a:off x="5689761" y="2495413"/>
+            <a:off x="4839816" y="2611995"/>
+            <a:ext cx="189257" cy="178683"/>
+          </a:xfrm>
+          <a:prstGeom prst="rect">
+            <a:avLst/>
+          </a:prstGeom>
+          <a:noFill/>
+        </p:spPr>
+        <p:txBody>
+          <a:bodyPr wrap="square" lIns="0" tIns="0" rIns="0" bIns="0" rtlCol="0">
+            <a:noAutofit/>
+          </a:bodyPr>
+          <a:lstStyle/>
+          <a:p>
+            <a:pPr algn="ctr"/>
+            <a:r>
+              <a:rPr lang="en-US" sz="1100" dirty="0">
+                <a:solidFill>
+                  <a:srgbClr val="7030A0"/>
+                </a:solidFill>
+              </a:rPr>
+              <a:t>*</a:t>
+            </a:r>
+            <a:endParaRPr lang="en-SG" sz="1100" dirty="0">
+              <a:solidFill>
+                <a:srgbClr val="7030A0"/>
+              </a:solidFill>
+            </a:endParaRPr>
+          </a:p>
+        </p:txBody>
+      </p:sp>
+      <p:sp>
+        <p:nvSpPr>
+          <p:cNvPr id="61" name="TextBox 60"/>
+          <p:cNvSpPr txBox="1"/>
+          <p:nvPr/>
+        </p:nvSpPr>
+        <p:spPr>
+          <a:xfrm>
+            <a:off x="5802930" y="1628521"/>
+            <a:ext cx="189257" cy="178683"/>
+          </a:xfrm>
+          <a:prstGeom prst="rect">
+            <a:avLst/>
+          </a:prstGeom>
+          <a:noFill/>
+        </p:spPr>
+        <p:txBody>
+          <a:bodyPr wrap="square" lIns="0" tIns="0" rIns="0" bIns="0" rtlCol="0">
+            <a:noAutofit/>
+          </a:bodyPr>
+          <a:lstStyle/>
+          <a:p>
+            <a:pPr algn="ctr"/>
+            <a:r>
+              <a:rPr lang="en-US" sz="1100" dirty="0">
+                <a:solidFill>
+                  <a:srgbClr val="7030A0"/>
+                </a:solidFill>
+              </a:rPr>
+              <a:t>*</a:t>
+            </a:r>
+            <a:endParaRPr lang="en-SG" sz="1100" dirty="0">
+              <a:solidFill>
+                <a:srgbClr val="7030A0"/>
+              </a:solidFill>
+            </a:endParaRPr>
+          </a:p>
+        </p:txBody>
+      </p:sp>
+      <p:sp>
+        <p:nvSpPr>
+          <p:cNvPr id="65" name="TextBox 64"/>
+          <p:cNvSpPr txBox="1"/>
+          <p:nvPr/>
+        </p:nvSpPr>
+        <p:spPr>
+          <a:xfrm>
+            <a:off x="2635928" y="2563712"/>
             <a:ext cx="189257" cy="178683"/>
           </a:xfrm>
           <a:prstGeom prst="rect">
@@ -5489,123 +5531,6 @@
       </p:sp>
       <p:sp>
         <p:nvSpPr>
-          <p:cNvPr id="60" name="TextBox 59"/>
-          <p:cNvSpPr txBox="1"/>
-          <p:nvPr/>
-        </p:nvSpPr>
-        <p:spPr>
-          <a:xfrm>
-            <a:off x="5163172" y="1778919"/>
-            <a:ext cx="189257" cy="178683"/>
-          </a:xfrm>
-          <a:prstGeom prst="rect">
-            <a:avLst/>
-          </a:prstGeom>
-          <a:noFill/>
-        </p:spPr>
-        <p:txBody>
-          <a:bodyPr wrap="square" lIns="0" tIns="0" rIns="0" bIns="0" rtlCol="0">
-            <a:noAutofit/>
-          </a:bodyPr>
-          <a:lstStyle/>
-          <a:p>
-            <a:pPr algn="ctr"/>
-            <a:r>
-              <a:rPr lang="en-US" sz="1100" dirty="0">
-                <a:solidFill>
-                  <a:srgbClr val="7030A0"/>
-                </a:solidFill>
-              </a:rPr>
-              <a:t>*</a:t>
-            </a:r>
-            <a:endParaRPr lang="en-SG" sz="1100" dirty="0">
-              <a:solidFill>
-                <a:srgbClr val="7030A0"/>
-              </a:solidFill>
-            </a:endParaRPr>
-          </a:p>
-        </p:txBody>
-      </p:sp>
-      <p:sp>
-        <p:nvSpPr>
-          <p:cNvPr id="61" name="TextBox 60"/>
-          <p:cNvSpPr txBox="1"/>
-          <p:nvPr/>
-        </p:nvSpPr>
-        <p:spPr>
-          <a:xfrm>
-            <a:off x="6135256" y="3097917"/>
-            <a:ext cx="189257" cy="178683"/>
-          </a:xfrm>
-          <a:prstGeom prst="rect">
-            <a:avLst/>
-          </a:prstGeom>
-          <a:noFill/>
-        </p:spPr>
-        <p:txBody>
-          <a:bodyPr wrap="square" lIns="0" tIns="0" rIns="0" bIns="0" rtlCol="0">
-            <a:noAutofit/>
-          </a:bodyPr>
-          <a:lstStyle/>
-          <a:p>
-            <a:pPr algn="ctr"/>
-            <a:r>
-              <a:rPr lang="en-US" sz="1100" dirty="0">
-                <a:solidFill>
-                  <a:srgbClr val="7030A0"/>
-                </a:solidFill>
-              </a:rPr>
-              <a:t>*</a:t>
-            </a:r>
-            <a:endParaRPr lang="en-SG" sz="1100" dirty="0">
-              <a:solidFill>
-                <a:srgbClr val="7030A0"/>
-              </a:solidFill>
-            </a:endParaRPr>
-          </a:p>
-        </p:txBody>
-      </p:sp>
-      <p:sp>
-        <p:nvSpPr>
-          <p:cNvPr id="65" name="TextBox 64"/>
-          <p:cNvSpPr txBox="1"/>
-          <p:nvPr/>
-        </p:nvSpPr>
-        <p:spPr>
-          <a:xfrm>
-            <a:off x="2635928" y="2563712"/>
-            <a:ext cx="189257" cy="178683"/>
-          </a:xfrm>
-          <a:prstGeom prst="rect">
-            <a:avLst/>
-          </a:prstGeom>
-          <a:noFill/>
-        </p:spPr>
-        <p:txBody>
-          <a:bodyPr wrap="square" lIns="0" tIns="0" rIns="0" bIns="0" rtlCol="0">
-            <a:noAutofit/>
-          </a:bodyPr>
-          <a:lstStyle/>
-          <a:p>
-            <a:pPr algn="ctr"/>
-            <a:r>
-              <a:rPr lang="en-US" sz="1100" dirty="0">
-                <a:solidFill>
-                  <a:srgbClr val="7030A0"/>
-                </a:solidFill>
-              </a:rPr>
-              <a:t>1</a:t>
-            </a:r>
-            <a:endParaRPr lang="en-SG" sz="1100" dirty="0">
-              <a:solidFill>
-                <a:srgbClr val="7030A0"/>
-              </a:solidFill>
-            </a:endParaRPr>
-          </a:p>
-        </p:txBody>
-      </p:sp>
-      <p:sp>
-        <p:nvSpPr>
           <p:cNvPr id="66" name="TextBox 65"/>
           <p:cNvSpPr txBox="1"/>
           <p:nvPr/>
@@ -5613,45 +5538,6 @@
         <p:spPr>
           <a:xfrm>
             <a:off x="2656370" y="3386050"/>
-            <a:ext cx="189257" cy="178683"/>
-          </a:xfrm>
-          <a:prstGeom prst="rect">
-            <a:avLst/>
-          </a:prstGeom>
-          <a:noFill/>
-        </p:spPr>
-        <p:txBody>
-          <a:bodyPr wrap="square" lIns="0" tIns="0" rIns="0" bIns="0" rtlCol="0">
-            <a:noAutofit/>
-          </a:bodyPr>
-          <a:lstStyle/>
-          <a:p>
-            <a:pPr algn="ctr"/>
-            <a:r>
-              <a:rPr lang="en-US" sz="1100" dirty="0">
-                <a:solidFill>
-                  <a:srgbClr val="7030A0"/>
-                </a:solidFill>
-              </a:rPr>
-              <a:t>1</a:t>
-            </a:r>
-            <a:endParaRPr lang="en-SG" sz="1100" dirty="0">
-              <a:solidFill>
-                <a:srgbClr val="7030A0"/>
-              </a:solidFill>
-            </a:endParaRPr>
-          </a:p>
-        </p:txBody>
-      </p:sp>
-      <p:sp>
-        <p:nvSpPr>
-          <p:cNvPr id="70" name="TextBox 69"/>
-          <p:cNvSpPr txBox="1"/>
-          <p:nvPr/>
-        </p:nvSpPr>
-        <p:spPr>
-          <a:xfrm>
-            <a:off x="6696638" y="2604731"/>
             <a:ext cx="189257" cy="178683"/>
           </a:xfrm>
           <a:prstGeom prst="rect">
@@ -5705,7 +5591,11 @@
           <a:prstGeom prst="line">
             <a:avLst/>
           </a:prstGeom>
-          <a:ln w="19050"/>
+          <a:ln w="19050">
+            <a:solidFill>
+              <a:srgbClr val="7030A0"/>
+            </a:solidFill>
+          </a:ln>
         </p:spPr>
         <p:style>
           <a:lnRef idx="1">
@@ -5737,14 +5627,18 @@
           <p:nvPr/>
         </p:nvCxnSpPr>
         <p:spPr>
-          <a:xfrm>
-            <a:off x="2230780" y="1597563"/>
-            <a:ext cx="4626247" cy="0"/>
+          <a:xfrm flipV="1">
+            <a:off x="2230780" y="1590674"/>
+            <a:ext cx="2575236" cy="6889"/>
           </a:xfrm>
           <a:prstGeom prst="line">
             <a:avLst/>
           </a:prstGeom>
-          <a:ln w="19050"/>
+          <a:ln w="19050">
+            <a:solidFill>
+              <a:srgbClr val="7030A0"/>
+            </a:solidFill>
+          </a:ln>
         </p:spPr>
         <p:style>
           <a:lnRef idx="1">
@@ -5770,18 +5664,23 @@
               </a:ext>
             </a:extLst>
           </p:cNvPr>
-          <p:cNvCxnSpPr/>
+          <p:cNvCxnSpPr>
+            <a:cxnSpLocks/>
+          </p:cNvCxnSpPr>
           <p:nvPr/>
         </p:nvCxnSpPr>
         <p:spPr>
           <a:xfrm>
-            <a:off x="6857027" y="1600200"/>
-            <a:ext cx="0" cy="1257866"/>
+            <a:off x="4806016" y="1581305"/>
+            <a:ext cx="0" cy="222844"/>
           </a:xfrm>
           <a:prstGeom prst="straightConnector1">
             <a:avLst/>
           </a:prstGeom>
           <a:ln w="19050">
+            <a:solidFill>
+              <a:srgbClr val="7030A0"/>
+            </a:solidFill>
             <a:tailEnd type="triangle"/>
           </a:ln>
         </p:spPr>
@@ -5814,7 +5713,7 @@
         </p:nvSpPr>
         <p:spPr>
           <a:xfrm>
-            <a:off x="4473539" y="4062872"/>
+            <a:off x="4491615" y="3521810"/>
             <a:ext cx="1270161" cy="290038"/>
           </a:xfrm>
           <a:prstGeom prst="rect">
@@ -5862,49 +5761,6 @@
           </a:p>
         </p:txBody>
       </p:sp>
-      <p:cxnSp>
-        <p:nvCxnSpPr>
-          <p:cNvPr id="34" name="Straight Connector 33">
-            <a:extLst>
-              <a:ext uri="{FF2B5EF4-FFF2-40B4-BE49-F238E27FC236}">
-                <a16:creationId xmlns:a16="http://schemas.microsoft.com/office/drawing/2014/main" id="{FB1902D5-9F6E-47F6-8311-7009271E0955}"/>
-              </a:ext>
-            </a:extLst>
-          </p:cNvPr>
-          <p:cNvCxnSpPr>
-            <a:cxnSpLocks/>
-          </p:cNvCxnSpPr>
-          <p:nvPr/>
-        </p:nvCxnSpPr>
-        <p:spPr>
-          <a:xfrm>
-            <a:off x="4348839" y="2745697"/>
-            <a:ext cx="0" cy="767989"/>
-          </a:xfrm>
-          <a:prstGeom prst="line">
-            <a:avLst/>
-          </a:prstGeom>
-          <a:ln w="19050">
-            <a:solidFill>
-              <a:srgbClr val="7030A0"/>
-            </a:solidFill>
-          </a:ln>
-        </p:spPr>
-        <p:style>
-          <a:lnRef idx="1">
-            <a:schemeClr val="accent4"/>
-          </a:lnRef>
-          <a:fillRef idx="0">
-            <a:schemeClr val="accent4"/>
-          </a:fillRef>
-          <a:effectRef idx="0">
-            <a:schemeClr val="accent4"/>
-          </a:effectRef>
-          <a:fontRef idx="minor">
-            <a:schemeClr val="tx1"/>
-          </a:fontRef>
-        </p:style>
-      </p:cxnSp>
       <p:sp>
         <p:nvSpPr>
           <p:cNvPr id="88" name="TextBox 87">
@@ -5964,7 +5820,7 @@
         </p:nvSpPr>
         <p:spPr>
           <a:xfrm>
-            <a:off x="7688786" y="2990621"/>
+            <a:off x="7004453" y="2622727"/>
             <a:ext cx="708186" cy="285783"/>
           </a:xfrm>
           <a:prstGeom prst="rect">
@@ -6025,8 +5881,8 @@
           <p:nvPr/>
         </p:nvSpPr>
         <p:spPr>
-          <a:xfrm rot="5400000">
-            <a:off x="4983183" y="4386414"/>
+          <a:xfrm rot="10800000">
+            <a:off x="5769776" y="3581399"/>
             <a:ext cx="236048" cy="173380"/>
           </a:xfrm>
           <a:prstGeom prst="flowChartDecision">
@@ -6079,7 +5935,7 @@
         </p:nvSpPr>
         <p:spPr>
           <a:xfrm>
-            <a:off x="4473239" y="3494748"/>
+            <a:off x="4486257" y="3990928"/>
             <a:ext cx="1156969" cy="346760"/>
           </a:xfrm>
           <a:prstGeom prst="rect">
@@ -6146,11 +6002,11 @@
         <p:spPr>
           <a:xfrm>
             <a:off x="4220351" y="2760681"/>
-            <a:ext cx="252888" cy="907447"/>
+            <a:ext cx="265906" cy="1403627"/>
           </a:xfrm>
           <a:prstGeom prst="bentConnector3">
             <a:avLst>
-              <a:gd name="adj1" fmla="val 50000"/>
+              <a:gd name="adj1" fmla="val 49104"/>
             </a:avLst>
           </a:prstGeom>
           <a:ln w="19050">
@@ -6191,7 +6047,7 @@
         </p:nvSpPr>
         <p:spPr>
           <a:xfrm>
-            <a:off x="6096476" y="3541272"/>
+            <a:off x="4684169" y="4742427"/>
             <a:ext cx="708186" cy="285783"/>
           </a:xfrm>
           <a:prstGeom prst="rect">
@@ -6252,8 +6108,8 @@
           <p:nvPr/>
         </p:nvSpPr>
         <p:spPr>
-          <a:xfrm>
-            <a:off x="5630208" y="3597474"/>
+          <a:xfrm rot="5400000">
+            <a:off x="4921666" y="4366142"/>
             <a:ext cx="236048" cy="173380"/>
           </a:xfrm>
           <a:prstGeom prst="flowChartDecision">
@@ -6285,8 +6141,8 @@
           <a:bodyPr rtlCol="0" anchor="ctr"/>
           <a:lstStyle/>
           <a:p>
-            <a:pPr algn="ctr"/>
-            <a:endParaRPr lang="en-US" sz="1050"/>
+            <a:pPr algn="r"/>
+            <a:endParaRPr lang="en-US" sz="1050" dirty="0"/>
           </a:p>
         </p:txBody>
       </p:sp>
@@ -6302,14 +6158,14 @@
           <p:cNvCxnSpPr>
             <a:cxnSpLocks/>
             <a:stCxn id="91" idx="3"/>
-            <a:endCxn id="87" idx="1"/>
+            <a:endCxn id="87" idx="0"/>
           </p:cNvCxnSpPr>
           <p:nvPr/>
         </p:nvCxnSpPr>
         <p:spPr>
-          <a:xfrm>
-            <a:off x="5866256" y="3684164"/>
-            <a:ext cx="230220" cy="0"/>
+          <a:xfrm flipH="1">
+            <a:off x="5038262" y="4570856"/>
+            <a:ext cx="1428" cy="171571"/>
           </a:xfrm>
           <a:prstGeom prst="straightConnector1">
             <a:avLst/>
@@ -6356,8 +6212,8 @@
         </p:nvCxnSpPr>
         <p:spPr>
           <a:xfrm>
-            <a:off x="7277995" y="3034891"/>
-            <a:ext cx="410791" cy="98622"/>
+            <a:off x="6628716" y="1439160"/>
+            <a:ext cx="375737" cy="1326459"/>
           </a:xfrm>
           <a:prstGeom prst="bentConnector3">
             <a:avLst>
@@ -6399,20 +6255,19 @@
           </p:cNvPr>
           <p:cNvCxnSpPr>
             <a:cxnSpLocks/>
-            <a:stCxn id="105" idx="3"/>
-            <a:endCxn id="49" idx="2"/>
           </p:cNvCxnSpPr>
           <p:nvPr/>
         </p:nvCxnSpPr>
         <p:spPr>
-          <a:xfrm flipH="1" flipV="1">
-            <a:off x="5065502" y="3194131"/>
-            <a:ext cx="1983864" cy="501503"/>
-          </a:xfrm>
-          <a:prstGeom prst="bentConnector4">
+          <a:xfrm rot="5400000" flipH="1" flipV="1">
+            <a:off x="3325321" y="3539453"/>
+            <a:ext cx="3469916" cy="8923"/>
+          </a:xfrm>
+          <a:prstGeom prst="bentConnector5">
             <a:avLst>
-              <a:gd name="adj1" fmla="val -11523"/>
-              <a:gd name="adj2" fmla="val 58643"/>
+              <a:gd name="adj1" fmla="val -1388"/>
+              <a:gd name="adj2" fmla="val 36527031"/>
+              <a:gd name="adj3" fmla="val 128365"/>
             </a:avLst>
           </a:prstGeom>
           <a:ln w="19050">
@@ -6452,8 +6307,8 @@
           <p:nvPr/>
         </p:nvSpPr>
         <p:spPr>
-          <a:xfrm>
-            <a:off x="6813318" y="3608944"/>
+          <a:xfrm rot="5400000">
+            <a:off x="4937788" y="5074156"/>
             <a:ext cx="236048" cy="173380"/>
           </a:xfrm>
           <a:prstGeom prst="flowChartDecision">
@@ -6506,7 +6361,7 @@
         </p:nvSpPr>
         <p:spPr>
           <a:xfrm>
-            <a:off x="7701152" y="3396853"/>
+            <a:off x="3885242" y="5539252"/>
             <a:ext cx="708186" cy="285783"/>
           </a:xfrm>
           <a:prstGeom prst="rect">
@@ -6568,7 +6423,7 @@
         </p:nvSpPr>
         <p:spPr>
           <a:xfrm>
-            <a:off x="7698042" y="3733800"/>
+            <a:off x="4646200" y="5539253"/>
             <a:ext cx="708186" cy="285783"/>
           </a:xfrm>
           <a:prstGeom prst="rect">
@@ -6630,7 +6485,7 @@
         </p:nvSpPr>
         <p:spPr>
           <a:xfrm>
-            <a:off x="7698042" y="4070747"/>
+            <a:off x="5407158" y="5539252"/>
             <a:ext cx="708186" cy="285783"/>
           </a:xfrm>
           <a:prstGeom prst="rect">
@@ -6689,19 +6544,17 @@
           </p:cNvPr>
           <p:cNvCxnSpPr>
             <a:cxnSpLocks/>
-            <a:stCxn id="105" idx="3"/>
-            <a:endCxn id="109" idx="1"/>
           </p:cNvCxnSpPr>
           <p:nvPr/>
         </p:nvCxnSpPr>
         <p:spPr>
-          <a:xfrm flipV="1">
-            <a:off x="7049366" y="3539745"/>
-            <a:ext cx="651786" cy="155889"/>
+          <a:xfrm rot="5400000">
+            <a:off x="4517383" y="5000824"/>
+            <a:ext cx="260382" cy="816477"/>
           </a:xfrm>
           <a:prstGeom prst="bentConnector3">
             <a:avLst>
-              <a:gd name="adj1" fmla="val 35366"/>
+              <a:gd name="adj1" fmla="val 17859"/>
             </a:avLst>
           </a:prstGeom>
           <a:ln w="19050">
@@ -6740,18 +6593,18 @@
           <p:cNvCxnSpPr>
             <a:cxnSpLocks/>
             <a:stCxn id="105" idx="3"/>
-            <a:endCxn id="111" idx="1"/>
+            <a:endCxn id="111" idx="0"/>
           </p:cNvCxnSpPr>
           <p:nvPr/>
         </p:nvCxnSpPr>
         <p:spPr>
-          <a:xfrm>
-            <a:off x="7049366" y="3695634"/>
-            <a:ext cx="648676" cy="181058"/>
+          <a:xfrm rot="5400000">
+            <a:off x="4897862" y="5381302"/>
+            <a:ext cx="260383" cy="55519"/>
           </a:xfrm>
           <a:prstGeom prst="bentConnector3">
             <a:avLst>
-              <a:gd name="adj1" fmla="val 35616"/>
+              <a:gd name="adj1" fmla="val 18449"/>
             </a:avLst>
           </a:prstGeom>
           <a:ln w="19050">
@@ -6789,19 +6642,17 @@
           </p:cNvPr>
           <p:cNvCxnSpPr>
             <a:cxnSpLocks/>
-            <a:stCxn id="105" idx="3"/>
-            <a:endCxn id="113" idx="1"/>
           </p:cNvCxnSpPr>
           <p:nvPr/>
         </p:nvCxnSpPr>
         <p:spPr>
-          <a:xfrm>
-            <a:off x="7049366" y="3695634"/>
-            <a:ext cx="648676" cy="518005"/>
+          <a:xfrm rot="16200000" flipH="1">
+            <a:off x="5278344" y="5056345"/>
+            <a:ext cx="260382" cy="705439"/>
           </a:xfrm>
           <a:prstGeom prst="bentConnector3">
             <a:avLst>
-              <a:gd name="adj1" fmla="val 34977"/>
+              <a:gd name="adj1" fmla="val 19049"/>
             </a:avLst>
           </a:prstGeom>
           <a:ln w="19050">
@@ -6842,7 +6693,7 @@
         </p:nvSpPr>
         <p:spPr>
           <a:xfrm>
-            <a:off x="7519565" y="3331601"/>
+            <a:off x="4007459" y="5334000"/>
             <a:ext cx="189257" cy="178683"/>
           </a:xfrm>
           <a:prstGeom prst="rect">
@@ -6887,7 +6738,7 @@
         </p:nvSpPr>
         <p:spPr>
           <a:xfrm>
-            <a:off x="7507203" y="3663672"/>
+            <a:off x="4763743" y="5346854"/>
             <a:ext cx="189257" cy="178683"/>
           </a:xfrm>
           <a:prstGeom prst="rect">
@@ -6932,52 +6783,7 @@
         </p:nvSpPr>
         <p:spPr>
           <a:xfrm>
-            <a:off x="7519565" y="4010876"/>
-            <a:ext cx="189257" cy="178683"/>
-          </a:xfrm>
-          <a:prstGeom prst="rect">
-            <a:avLst/>
-          </a:prstGeom>
-          <a:noFill/>
-        </p:spPr>
-        <p:txBody>
-          <a:bodyPr wrap="square" lIns="0" tIns="0" rIns="0" bIns="0" rtlCol="0">
-            <a:noAutofit/>
-          </a:bodyPr>
-          <a:lstStyle/>
-          <a:p>
-            <a:pPr algn="ctr"/>
-            <a:r>
-              <a:rPr lang="en-US" sz="1100" dirty="0">
-                <a:solidFill>
-                  <a:srgbClr val="7030A0"/>
-                </a:solidFill>
-              </a:rPr>
-              <a:t>1</a:t>
-            </a:r>
-            <a:endParaRPr lang="en-SG" sz="1100" dirty="0">
-              <a:solidFill>
-                <a:srgbClr val="7030A0"/>
-              </a:solidFill>
-            </a:endParaRPr>
-          </a:p>
-        </p:txBody>
-      </p:sp>
-      <p:sp>
-        <p:nvSpPr>
-          <p:cNvPr id="130" name="TextBox 129">
-            <a:extLst>
-              <a:ext uri="{FF2B5EF4-FFF2-40B4-BE49-F238E27FC236}">
-                <a16:creationId xmlns:a16="http://schemas.microsoft.com/office/drawing/2014/main" id="{D8E187D9-2707-4B65-B23B-6280B7271112}"/>
-              </a:ext>
-            </a:extLst>
-          </p:cNvPr>
-          <p:cNvSpPr txBox="1"/>
-          <p:nvPr/>
-        </p:nvSpPr>
-        <p:spPr>
-          <a:xfrm>
-            <a:off x="5078790" y="3199061"/>
+            <a:off x="5548598" y="5346854"/>
             <a:ext cx="189257" cy="178683"/>
           </a:xfrm>
           <a:prstGeom prst="rect">
@@ -7027,11 +6833,11 @@
         <p:spPr>
           <a:xfrm>
             <a:off x="4220351" y="2760681"/>
-            <a:ext cx="253188" cy="1447210"/>
+            <a:ext cx="271264" cy="906148"/>
           </a:xfrm>
           <a:prstGeom prst="bentConnector3">
             <a:avLst>
-              <a:gd name="adj1" fmla="val 50000"/>
+              <a:gd name="adj1" fmla="val 47805"/>
             </a:avLst>
           </a:prstGeom>
           <a:ln w="19050">
@@ -7072,7 +6878,7 @@
         </p:nvSpPr>
         <p:spPr>
           <a:xfrm>
-            <a:off x="3657600" y="4942362"/>
+            <a:off x="6483599" y="3518956"/>
             <a:ext cx="829417" cy="285783"/>
           </a:xfrm>
           <a:prstGeom prst="rect">
@@ -7134,7 +6940,7 @@
         </p:nvSpPr>
         <p:spPr>
           <a:xfrm>
-            <a:off x="4562050" y="4942362"/>
+            <a:off x="6483599" y="4841520"/>
             <a:ext cx="924350" cy="285783"/>
           </a:xfrm>
           <a:prstGeom prst="rect">
@@ -7196,7 +7002,7 @@
         </p:nvSpPr>
         <p:spPr>
           <a:xfrm>
-            <a:off x="5562600" y="4942362"/>
+            <a:off x="6483599" y="4511187"/>
             <a:ext cx="990600" cy="285783"/>
           </a:xfrm>
           <a:prstGeom prst="rect">
@@ -7258,7 +7064,7 @@
         </p:nvSpPr>
         <p:spPr>
           <a:xfrm>
-            <a:off x="6629400" y="4942362"/>
+            <a:off x="6483599" y="4180854"/>
             <a:ext cx="1067060" cy="285783"/>
           </a:xfrm>
           <a:prstGeom prst="rect">
@@ -7320,7 +7126,7 @@
         </p:nvSpPr>
         <p:spPr>
           <a:xfrm>
-            <a:off x="2512186" y="4942361"/>
+            <a:off x="6483599" y="3848036"/>
             <a:ext cx="1067060" cy="285783"/>
           </a:xfrm>
           <a:prstGeom prst="rect">
@@ -7368,31 +7174,205 @@
           </a:p>
         </p:txBody>
       </p:sp>
+      <p:sp>
+        <p:nvSpPr>
+          <p:cNvPr id="176" name="TextBox 175">
+            <a:extLst>
+              <a:ext uri="{FF2B5EF4-FFF2-40B4-BE49-F238E27FC236}">
+                <a16:creationId xmlns:a16="http://schemas.microsoft.com/office/drawing/2014/main" id="{681C3556-7DF4-4223-B540-CB6A997C3C18}"/>
+              </a:ext>
+            </a:extLst>
+          </p:cNvPr>
+          <p:cNvSpPr txBox="1"/>
+          <p:nvPr/>
+        </p:nvSpPr>
+        <p:spPr>
+          <a:xfrm>
+            <a:off x="4828985" y="4603422"/>
+            <a:ext cx="189257" cy="178683"/>
+          </a:xfrm>
+          <a:prstGeom prst="rect">
+            <a:avLst/>
+          </a:prstGeom>
+          <a:noFill/>
+        </p:spPr>
+        <p:txBody>
+          <a:bodyPr wrap="square" lIns="0" tIns="0" rIns="0" bIns="0" rtlCol="0">
+            <a:noAutofit/>
+          </a:bodyPr>
+          <a:lstStyle/>
+          <a:p>
+            <a:pPr algn="ctr"/>
+            <a:r>
+              <a:rPr lang="en-US" sz="1100" dirty="0">
+                <a:solidFill>
+                  <a:srgbClr val="7030A0"/>
+                </a:solidFill>
+              </a:rPr>
+              <a:t>*</a:t>
+            </a:r>
+            <a:endParaRPr lang="en-SG" sz="1100" dirty="0">
+              <a:solidFill>
+                <a:srgbClr val="7030A0"/>
+              </a:solidFill>
+            </a:endParaRPr>
+          </a:p>
+        </p:txBody>
+      </p:sp>
+      <p:sp>
+        <p:nvSpPr>
+          <p:cNvPr id="178" name="TextBox 177">
+            <a:extLst>
+              <a:ext uri="{FF2B5EF4-FFF2-40B4-BE49-F238E27FC236}">
+                <a16:creationId xmlns:a16="http://schemas.microsoft.com/office/drawing/2014/main" id="{81FCDF07-B86C-4928-80D9-3CFFC406F262}"/>
+              </a:ext>
+            </a:extLst>
+          </p:cNvPr>
+          <p:cNvSpPr txBox="1"/>
+          <p:nvPr/>
+        </p:nvSpPr>
+        <p:spPr>
+          <a:xfrm>
+            <a:off x="4322683" y="3942777"/>
+            <a:ext cx="189257" cy="178683"/>
+          </a:xfrm>
+          <a:prstGeom prst="rect">
+            <a:avLst/>
+          </a:prstGeom>
+          <a:noFill/>
+        </p:spPr>
+        <p:txBody>
+          <a:bodyPr wrap="square" lIns="0" tIns="0" rIns="0" bIns="0" rtlCol="0">
+            <a:noAutofit/>
+          </a:bodyPr>
+          <a:lstStyle/>
+          <a:p>
+            <a:pPr algn="ctr"/>
+            <a:r>
+              <a:rPr lang="en-US" sz="1100" dirty="0">
+                <a:solidFill>
+                  <a:srgbClr val="7030A0"/>
+                </a:solidFill>
+              </a:rPr>
+              <a:t>1</a:t>
+            </a:r>
+            <a:endParaRPr lang="en-SG" sz="1100" dirty="0">
+              <a:solidFill>
+                <a:srgbClr val="7030A0"/>
+              </a:solidFill>
+            </a:endParaRPr>
+          </a:p>
+        </p:txBody>
+      </p:sp>
       <p:cxnSp>
         <p:nvCxnSpPr>
-          <p:cNvPr id="152" name="Elbow Connector 85">
+          <p:cNvPr id="206" name="Straight Connector 205">
             <a:extLst>
               <a:ext uri="{FF2B5EF4-FFF2-40B4-BE49-F238E27FC236}">
-                <a16:creationId xmlns:a16="http://schemas.microsoft.com/office/drawing/2014/main" id="{5E8982BE-7969-48DE-ADE2-B3E539D76496}"/>
+                <a16:creationId xmlns:a16="http://schemas.microsoft.com/office/drawing/2014/main" id="{BFA1B39D-F08C-4E0B-B5A8-CEBD45FB8281}"/>
               </a:ext>
             </a:extLst>
           </p:cNvPr>
           <p:cNvCxnSpPr>
             <a:cxnSpLocks/>
-            <a:stCxn id="96" idx="3"/>
-            <a:endCxn id="142" idx="0"/>
+            <a:endCxn id="9" idx="1"/>
           </p:cNvCxnSpPr>
           <p:nvPr/>
         </p:nvCxnSpPr>
         <p:spPr>
+          <a:xfrm flipV="1">
+            <a:off x="2230780" y="3588885"/>
+            <a:ext cx="1" cy="253470"/>
+          </a:xfrm>
+          <a:prstGeom prst="line">
+            <a:avLst/>
+          </a:prstGeom>
+          <a:ln w="19050">
+            <a:solidFill>
+              <a:srgbClr val="7030A0"/>
+            </a:solidFill>
+          </a:ln>
+        </p:spPr>
+        <p:style>
+          <a:lnRef idx="1">
+            <a:schemeClr val="accent4"/>
+          </a:lnRef>
+          <a:fillRef idx="0">
+            <a:schemeClr val="accent4"/>
+          </a:fillRef>
+          <a:effectRef idx="0">
+            <a:schemeClr val="accent4"/>
+          </a:effectRef>
+          <a:fontRef idx="minor">
+            <a:schemeClr val="tx1"/>
+          </a:fontRef>
+        </p:style>
+      </p:cxnSp>
+      <p:cxnSp>
+        <p:nvCxnSpPr>
+          <p:cNvPr id="212" name="Straight Connector 211">
+            <a:extLst>
+              <a:ext uri="{FF2B5EF4-FFF2-40B4-BE49-F238E27FC236}">
+                <a16:creationId xmlns:a16="http://schemas.microsoft.com/office/drawing/2014/main" id="{14473E73-AFE7-44AF-AC6B-704EAE6DCD28}"/>
+              </a:ext>
+            </a:extLst>
+          </p:cNvPr>
+          <p:cNvCxnSpPr>
+            <a:cxnSpLocks/>
+          </p:cNvCxnSpPr>
+          <p:nvPr/>
+        </p:nvCxnSpPr>
+        <p:spPr>
+          <a:xfrm>
+            <a:off x="2217495" y="3849179"/>
+            <a:ext cx="1766808" cy="0"/>
+          </a:xfrm>
+          <a:prstGeom prst="line">
+            <a:avLst/>
+          </a:prstGeom>
+          <a:ln w="19050">
+            <a:solidFill>
+              <a:srgbClr val="7030A0"/>
+            </a:solidFill>
+          </a:ln>
+        </p:spPr>
+        <p:style>
+          <a:lnRef idx="1">
+            <a:schemeClr val="accent4"/>
+          </a:lnRef>
+          <a:fillRef idx="0">
+            <a:schemeClr val="accent4"/>
+          </a:fillRef>
+          <a:effectRef idx="0">
+            <a:schemeClr val="accent4"/>
+          </a:effectRef>
+          <a:fontRef idx="minor">
+            <a:schemeClr val="tx1"/>
+          </a:fontRef>
+        </p:style>
+      </p:cxnSp>
+      <p:cxnSp>
+        <p:nvCxnSpPr>
+          <p:cNvPr id="216" name="Elbow Connector 85">
+            <a:extLst>
+              <a:ext uri="{FF2B5EF4-FFF2-40B4-BE49-F238E27FC236}">
+                <a16:creationId xmlns:a16="http://schemas.microsoft.com/office/drawing/2014/main" id="{AF9B596E-30A3-49EC-BDD7-1857C1FE60BD}"/>
+              </a:ext>
+            </a:extLst>
+          </p:cNvPr>
+          <p:cNvCxnSpPr>
+            <a:cxnSpLocks/>
+            <a:endCxn id="87" idx="1"/>
+          </p:cNvCxnSpPr>
+          <p:nvPr/>
+        </p:nvCxnSpPr>
+        <p:spPr>
           <a:xfrm rot="16200000" flipH="1">
-            <a:off x="5956451" y="3735883"/>
-            <a:ext cx="351234" cy="2061723"/>
-          </a:xfrm>
-          <a:prstGeom prst="bentConnector3">
-            <a:avLst>
-              <a:gd name="adj1" fmla="val 50000"/>
-            </a:avLst>
+            <a:off x="3814127" y="4015276"/>
+            <a:ext cx="1042983" cy="697101"/>
+          </a:xfrm>
+          <a:prstGeom prst="bentConnector2">
+            <a:avLst/>
           </a:prstGeom>
           <a:ln w="19050">
             <a:solidFill>
@@ -7418,26 +7398,116 @@
           </a:fontRef>
         </p:style>
       </p:cxnSp>
+      <p:sp>
+        <p:nvSpPr>
+          <p:cNvPr id="241" name="TextBox 240">
+            <a:extLst>
+              <a:ext uri="{FF2B5EF4-FFF2-40B4-BE49-F238E27FC236}">
+                <a16:creationId xmlns:a16="http://schemas.microsoft.com/office/drawing/2014/main" id="{79A3C8EE-38DE-485F-901A-1ED35584C250}"/>
+              </a:ext>
+            </a:extLst>
+          </p:cNvPr>
+          <p:cNvSpPr txBox="1"/>
+          <p:nvPr/>
+        </p:nvSpPr>
+        <p:spPr>
+          <a:xfrm rot="16200000">
+            <a:off x="3447883" y="4332263"/>
+            <a:ext cx="881018" cy="261610"/>
+          </a:xfrm>
+          <a:prstGeom prst="rect">
+            <a:avLst/>
+          </a:prstGeom>
+          <a:noFill/>
+        </p:spPr>
+        <p:txBody>
+          <a:bodyPr wrap="square" rtlCol="0">
+            <a:spAutoFit/>
+          </a:bodyPr>
+          <a:lstStyle/>
+          <a:p>
+            <a:pPr algn="r"/>
+            <a:r>
+              <a:rPr lang="en-US" sz="1100" dirty="0">
+                <a:solidFill>
+                  <a:srgbClr val="7030A0"/>
+                </a:solidFill>
+              </a:rPr>
+              <a:t>filtered list</a:t>
+            </a:r>
+            <a:endParaRPr lang="en-SG" sz="1100" dirty="0">
+              <a:solidFill>
+                <a:srgbClr val="7030A0"/>
+              </a:solidFill>
+            </a:endParaRPr>
+          </a:p>
+        </p:txBody>
+      </p:sp>
+      <p:sp>
+        <p:nvSpPr>
+          <p:cNvPr id="242" name="TextBox 241">
+            <a:extLst>
+              <a:ext uri="{FF2B5EF4-FFF2-40B4-BE49-F238E27FC236}">
+                <a16:creationId xmlns:a16="http://schemas.microsoft.com/office/drawing/2014/main" id="{B6DB0173-0D1D-46DD-83EE-1ACA0005FEDC}"/>
+              </a:ext>
+            </a:extLst>
+          </p:cNvPr>
+          <p:cNvSpPr txBox="1"/>
+          <p:nvPr/>
+        </p:nvSpPr>
+        <p:spPr>
+          <a:xfrm>
+            <a:off x="4423986" y="4687301"/>
+            <a:ext cx="189257" cy="178683"/>
+          </a:xfrm>
+          <a:prstGeom prst="rect">
+            <a:avLst/>
+          </a:prstGeom>
+          <a:noFill/>
+        </p:spPr>
+        <p:txBody>
+          <a:bodyPr wrap="square" lIns="0" tIns="0" rIns="0" bIns="0" rtlCol="0">
+            <a:noAutofit/>
+          </a:bodyPr>
+          <a:lstStyle/>
+          <a:p>
+            <a:pPr algn="ctr"/>
+            <a:r>
+              <a:rPr lang="en-US" sz="1100" dirty="0">
+                <a:solidFill>
+                  <a:srgbClr val="7030A0"/>
+                </a:solidFill>
+              </a:rPr>
+              <a:t>1</a:t>
+            </a:r>
+            <a:endParaRPr lang="en-SG" sz="1100" dirty="0">
+              <a:solidFill>
+                <a:srgbClr val="7030A0"/>
+              </a:solidFill>
+            </a:endParaRPr>
+          </a:p>
+        </p:txBody>
+      </p:sp>
       <p:cxnSp>
         <p:nvCxnSpPr>
-          <p:cNvPr id="155" name="Elbow Connector 85">
+          <p:cNvPr id="245" name="Elbow Connector 85">
             <a:extLst>
               <a:ext uri="{FF2B5EF4-FFF2-40B4-BE49-F238E27FC236}">
-                <a16:creationId xmlns:a16="http://schemas.microsoft.com/office/drawing/2014/main" id="{A0DFCF94-0342-466D-98E2-FD6B69CD1BF9}"/>
+                <a16:creationId xmlns:a16="http://schemas.microsoft.com/office/drawing/2014/main" id="{CED8F0EF-095D-4DEF-84A7-BA83CC8108C9}"/>
               </a:ext>
             </a:extLst>
           </p:cNvPr>
           <p:cNvCxnSpPr>
             <a:cxnSpLocks/>
-            <a:stCxn id="96" idx="3"/>
-            <a:endCxn id="141" idx="0"/>
+            <a:stCxn id="96" idx="1"/>
+            <a:endCxn id="140" idx="1"/>
           </p:cNvCxnSpPr>
           <p:nvPr/>
         </p:nvCxnSpPr>
         <p:spPr>
-          <a:xfrm rot="16200000" flipH="1">
-            <a:off x="5403936" y="4288398"/>
-            <a:ext cx="351234" cy="956693"/>
+          <a:xfrm>
+            <a:off x="6005824" y="3668089"/>
+            <a:ext cx="477775" cy="1316323"/>
           </a:xfrm>
           <a:prstGeom prst="bentConnector3">
             <a:avLst>
@@ -7470,24 +7540,24 @@
       </p:cxnSp>
       <p:cxnSp>
         <p:nvCxnSpPr>
-          <p:cNvPr id="158" name="Elbow Connector 85">
+          <p:cNvPr id="248" name="Elbow Connector 85">
             <a:extLst>
               <a:ext uri="{FF2B5EF4-FFF2-40B4-BE49-F238E27FC236}">
-                <a16:creationId xmlns:a16="http://schemas.microsoft.com/office/drawing/2014/main" id="{E00FDF5F-5AC1-40BB-9124-42F79C20D245}"/>
+                <a16:creationId xmlns:a16="http://schemas.microsoft.com/office/drawing/2014/main" id="{A6B39326-C732-48FB-8BEE-82FEFABF096E}"/>
               </a:ext>
             </a:extLst>
           </p:cNvPr>
           <p:cNvCxnSpPr>
             <a:cxnSpLocks/>
-            <a:stCxn id="96" idx="3"/>
-            <a:endCxn id="140" idx="0"/>
+            <a:stCxn id="96" idx="1"/>
+            <a:endCxn id="141" idx="1"/>
           </p:cNvCxnSpPr>
           <p:nvPr/>
         </p:nvCxnSpPr>
         <p:spPr>
-          <a:xfrm rot="5400000">
-            <a:off x="4887099" y="4728254"/>
-            <a:ext cx="351234" cy="76982"/>
+          <a:xfrm>
+            <a:off x="6005824" y="3668089"/>
+            <a:ext cx="477775" cy="985990"/>
           </a:xfrm>
           <a:prstGeom prst="bentConnector3">
             <a:avLst>
@@ -7520,24 +7590,24 @@
       </p:cxnSp>
       <p:cxnSp>
         <p:nvCxnSpPr>
-          <p:cNvPr id="161" name="Elbow Connector 85">
+          <p:cNvPr id="251" name="Elbow Connector 85">
             <a:extLst>
               <a:ext uri="{FF2B5EF4-FFF2-40B4-BE49-F238E27FC236}">
-                <a16:creationId xmlns:a16="http://schemas.microsoft.com/office/drawing/2014/main" id="{1CEDA95C-4725-4195-BEFB-6182D3AA3208}"/>
+                <a16:creationId xmlns:a16="http://schemas.microsoft.com/office/drawing/2014/main" id="{27868FF5-D337-41E3-88CB-631AA64872E6}"/>
               </a:ext>
             </a:extLst>
           </p:cNvPr>
           <p:cNvCxnSpPr>
             <a:cxnSpLocks/>
-            <a:stCxn id="96" idx="3"/>
-            <a:endCxn id="138" idx="0"/>
+            <a:stCxn id="96" idx="1"/>
+            <a:endCxn id="142" idx="1"/>
           </p:cNvCxnSpPr>
           <p:nvPr/>
         </p:nvCxnSpPr>
         <p:spPr>
-          <a:xfrm rot="5400000">
-            <a:off x="4411141" y="4252296"/>
-            <a:ext cx="351234" cy="1028898"/>
+          <a:xfrm>
+            <a:off x="6005824" y="3668089"/>
+            <a:ext cx="477775" cy="655657"/>
           </a:xfrm>
           <a:prstGeom prst="bentConnector3">
             <a:avLst>
@@ -7570,24 +7640,24 @@
       </p:cxnSp>
       <p:cxnSp>
         <p:nvCxnSpPr>
-          <p:cNvPr id="164" name="Elbow Connector 85">
+          <p:cNvPr id="254" name="Elbow Connector 85">
             <a:extLst>
               <a:ext uri="{FF2B5EF4-FFF2-40B4-BE49-F238E27FC236}">
-                <a16:creationId xmlns:a16="http://schemas.microsoft.com/office/drawing/2014/main" id="{95AFFF0D-77EE-41B0-93FC-28D215014C19}"/>
+                <a16:creationId xmlns:a16="http://schemas.microsoft.com/office/drawing/2014/main" id="{B8313D9E-24B8-46F3-9587-D39CC26C9890}"/>
               </a:ext>
             </a:extLst>
           </p:cNvPr>
           <p:cNvCxnSpPr>
             <a:cxnSpLocks/>
-            <a:stCxn id="96" idx="3"/>
-            <a:endCxn id="151" idx="0"/>
+            <a:stCxn id="96" idx="1"/>
+            <a:endCxn id="151" idx="1"/>
           </p:cNvCxnSpPr>
           <p:nvPr/>
         </p:nvCxnSpPr>
         <p:spPr>
-          <a:xfrm rot="5400000">
-            <a:off x="3897846" y="3738999"/>
-            <a:ext cx="351233" cy="2055491"/>
+          <a:xfrm>
+            <a:off x="6005824" y="3668089"/>
+            <a:ext cx="477775" cy="322839"/>
           </a:xfrm>
           <a:prstGeom prst="bentConnector3">
             <a:avLst>
@@ -7620,29 +7690,28 @@
       </p:cxnSp>
       <p:cxnSp>
         <p:nvCxnSpPr>
-          <p:cNvPr id="167" name="Elbow Connector 85">
+          <p:cNvPr id="257" name="Elbow Connector 85">
             <a:extLst>
               <a:ext uri="{FF2B5EF4-FFF2-40B4-BE49-F238E27FC236}">
-                <a16:creationId xmlns:a16="http://schemas.microsoft.com/office/drawing/2014/main" id="{31EA62A9-A348-438B-BF97-00476AAD089C}"/>
+                <a16:creationId xmlns:a16="http://schemas.microsoft.com/office/drawing/2014/main" id="{735C7CEE-BC15-4E94-86FD-05F521FBF631}"/>
               </a:ext>
             </a:extLst>
           </p:cNvPr>
           <p:cNvCxnSpPr>
             <a:cxnSpLocks/>
-            <a:stCxn id="96" idx="3"/>
-            <a:endCxn id="89" idx="3"/>
+            <a:stCxn id="96" idx="1"/>
+            <a:endCxn id="138" idx="1"/>
           </p:cNvCxnSpPr>
           <p:nvPr/>
         </p:nvCxnSpPr>
         <p:spPr>
-          <a:xfrm rot="5400000" flipH="1" flipV="1">
-            <a:off x="6020281" y="2214438"/>
-            <a:ext cx="1457615" cy="3295765"/>
-          </a:xfrm>
-          <a:prstGeom prst="bentConnector4">
+          <a:xfrm flipV="1">
+            <a:off x="6005824" y="3661848"/>
+            <a:ext cx="477775" cy="6241"/>
+          </a:xfrm>
+          <a:prstGeom prst="bentConnector3">
             <a:avLst>
-              <a:gd name="adj1" fmla="val -12081"/>
-              <a:gd name="adj2" fmla="val 106936"/>
+              <a:gd name="adj1" fmla="val 50000"/>
             </a:avLst>
           </a:prstGeom>
           <a:ln w="19050">
@@ -7669,12 +7738,191 @@
           </a:fontRef>
         </p:style>
       </p:cxnSp>
-      <p:sp>
-        <p:nvSpPr>
-          <p:cNvPr id="176" name="TextBox 175">
+      <p:cxnSp>
+        <p:nvCxnSpPr>
+          <p:cNvPr id="359" name="Straight Connector 358">
             <a:extLst>
               <a:ext uri="{FF2B5EF4-FFF2-40B4-BE49-F238E27FC236}">
-                <a16:creationId xmlns:a16="http://schemas.microsoft.com/office/drawing/2014/main" id="{681C3556-7DF4-4223-B540-CB6A997C3C18}"/>
+                <a16:creationId xmlns:a16="http://schemas.microsoft.com/office/drawing/2014/main" id="{DE434D1B-76BB-40EB-98FE-58206ECDC457}"/>
+              </a:ext>
+            </a:extLst>
+          </p:cNvPr>
+          <p:cNvCxnSpPr>
+            <a:cxnSpLocks/>
+          </p:cNvCxnSpPr>
+          <p:nvPr/>
+        </p:nvCxnSpPr>
+        <p:spPr>
+          <a:xfrm flipV="1">
+            <a:off x="6249450" y="3427285"/>
+            <a:ext cx="1" cy="253470"/>
+          </a:xfrm>
+          <a:prstGeom prst="line">
+            <a:avLst/>
+          </a:prstGeom>
+          <a:ln w="19050">
+            <a:solidFill>
+              <a:srgbClr val="7030A0"/>
+            </a:solidFill>
+          </a:ln>
+        </p:spPr>
+        <p:style>
+          <a:lnRef idx="1">
+            <a:schemeClr val="accent4"/>
+          </a:lnRef>
+          <a:fillRef idx="0">
+            <a:schemeClr val="accent4"/>
+          </a:fillRef>
+          <a:effectRef idx="0">
+            <a:schemeClr val="accent4"/>
+          </a:effectRef>
+          <a:fontRef idx="minor">
+            <a:schemeClr val="tx1"/>
+          </a:fontRef>
+        </p:style>
+      </p:cxnSp>
+      <p:cxnSp>
+        <p:nvCxnSpPr>
+          <p:cNvPr id="395" name="Straight Connector 394">
+            <a:extLst>
+              <a:ext uri="{FF2B5EF4-FFF2-40B4-BE49-F238E27FC236}">
+                <a16:creationId xmlns:a16="http://schemas.microsoft.com/office/drawing/2014/main" id="{68E6D539-92C4-4654-AE1D-6AEDB13DB81F}"/>
+              </a:ext>
+            </a:extLst>
+          </p:cNvPr>
+          <p:cNvCxnSpPr>
+            <a:cxnSpLocks/>
+          </p:cNvCxnSpPr>
+          <p:nvPr/>
+        </p:nvCxnSpPr>
+        <p:spPr>
+          <a:xfrm>
+            <a:off x="6239551" y="3429000"/>
+            <a:ext cx="1118995" cy="0"/>
+          </a:xfrm>
+          <a:prstGeom prst="line">
+            <a:avLst/>
+          </a:prstGeom>
+          <a:ln w="19050">
+            <a:solidFill>
+              <a:srgbClr val="7030A0"/>
+            </a:solidFill>
+          </a:ln>
+        </p:spPr>
+        <p:style>
+          <a:lnRef idx="1">
+            <a:schemeClr val="accent4"/>
+          </a:lnRef>
+          <a:fillRef idx="0">
+            <a:schemeClr val="accent4"/>
+          </a:fillRef>
+          <a:effectRef idx="0">
+            <a:schemeClr val="accent4"/>
+          </a:effectRef>
+          <a:fontRef idx="minor">
+            <a:schemeClr val="tx1"/>
+          </a:fontRef>
+        </p:style>
+      </p:cxnSp>
+      <p:cxnSp>
+        <p:nvCxnSpPr>
+          <p:cNvPr id="401" name="Straight Arrow Connector 400">
+            <a:extLst>
+              <a:ext uri="{FF2B5EF4-FFF2-40B4-BE49-F238E27FC236}">
+                <a16:creationId xmlns:a16="http://schemas.microsoft.com/office/drawing/2014/main" id="{4F006A6C-70CE-4F12-89AD-DED53B505966}"/>
+              </a:ext>
+            </a:extLst>
+          </p:cNvPr>
+          <p:cNvCxnSpPr>
+            <a:cxnSpLocks/>
+            <a:endCxn id="89" idx="2"/>
+          </p:cNvCxnSpPr>
+          <p:nvPr/>
+        </p:nvCxnSpPr>
+        <p:spPr>
+          <a:xfrm flipV="1">
+            <a:off x="7358546" y="2908510"/>
+            <a:ext cx="0" cy="518775"/>
+          </a:xfrm>
+          <a:prstGeom prst="straightConnector1">
+            <a:avLst/>
+          </a:prstGeom>
+          <a:ln w="19050">
+            <a:solidFill>
+              <a:srgbClr val="7030A0"/>
+            </a:solidFill>
+            <a:tailEnd type="triangle"/>
+          </a:ln>
+        </p:spPr>
+        <p:style>
+          <a:lnRef idx="1">
+            <a:schemeClr val="accent4"/>
+          </a:lnRef>
+          <a:fillRef idx="0">
+            <a:schemeClr val="accent4"/>
+          </a:fillRef>
+          <a:effectRef idx="0">
+            <a:schemeClr val="accent4"/>
+          </a:effectRef>
+          <a:fontRef idx="minor">
+            <a:schemeClr val="tx1"/>
+          </a:fontRef>
+        </p:style>
+      </p:cxnSp>
+      <p:cxnSp>
+        <p:nvCxnSpPr>
+          <p:cNvPr id="418" name="Straight Arrow Connector 417">
+            <a:extLst>
+              <a:ext uri="{FF2B5EF4-FFF2-40B4-BE49-F238E27FC236}">
+                <a16:creationId xmlns:a16="http://schemas.microsoft.com/office/drawing/2014/main" id="{949C07D1-F924-4D5B-94AC-C2B2AC367D5D}"/>
+              </a:ext>
+            </a:extLst>
+          </p:cNvPr>
+          <p:cNvCxnSpPr>
+            <a:cxnSpLocks/>
+            <a:stCxn id="68" idx="3"/>
+            <a:endCxn id="67" idx="2"/>
+          </p:cNvCxnSpPr>
+          <p:nvPr/>
+        </p:nvCxnSpPr>
+        <p:spPr>
+          <a:xfrm flipH="1" flipV="1">
+            <a:off x="5044017" y="2630327"/>
+            <a:ext cx="196" cy="160748"/>
+          </a:xfrm>
+          <a:prstGeom prst="straightConnector1">
+            <a:avLst/>
+          </a:prstGeom>
+          <a:ln w="19050">
+            <a:solidFill>
+              <a:srgbClr val="7030A0"/>
+            </a:solidFill>
+            <a:headEnd type="none" w="med" len="med"/>
+            <a:tailEnd type="arrow" w="med" len="med"/>
+          </a:ln>
+          <a:effectLst/>
+        </p:spPr>
+        <p:style>
+          <a:lnRef idx="1">
+            <a:schemeClr val="accent2"/>
+          </a:lnRef>
+          <a:fillRef idx="2">
+            <a:schemeClr val="accent2"/>
+          </a:fillRef>
+          <a:effectRef idx="1">
+            <a:schemeClr val="accent2"/>
+          </a:effectRef>
+          <a:fontRef idx="minor">
+            <a:schemeClr val="dk1"/>
+          </a:fontRef>
+        </p:style>
+      </p:cxnSp>
+      <p:sp>
+        <p:nvSpPr>
+          <p:cNvPr id="423" name="TextBox 422">
+            <a:extLst>
+              <a:ext uri="{FF2B5EF4-FFF2-40B4-BE49-F238E27FC236}">
+                <a16:creationId xmlns:a16="http://schemas.microsoft.com/office/drawing/2014/main" id="{1F8977A0-B259-4C91-A110-D20E5A3CE8AF}"/>
               </a:ext>
             </a:extLst>
           </p:cNvPr>
@@ -7683,52 +7931,7 @@
         </p:nvSpPr>
         <p:spPr>
           <a:xfrm>
-            <a:off x="5952945" y="3714452"/>
-            <a:ext cx="189257" cy="178683"/>
-          </a:xfrm>
-          <a:prstGeom prst="rect">
-            <a:avLst/>
-          </a:prstGeom>
-          <a:noFill/>
-        </p:spPr>
-        <p:txBody>
-          <a:bodyPr wrap="square" lIns="0" tIns="0" rIns="0" bIns="0" rtlCol="0">
-            <a:noAutofit/>
-          </a:bodyPr>
-          <a:lstStyle/>
-          <a:p>
-            <a:pPr algn="ctr"/>
-            <a:r>
-              <a:rPr lang="en-US" sz="1100" dirty="0">
-                <a:solidFill>
-                  <a:srgbClr val="7030A0"/>
-                </a:solidFill>
-              </a:rPr>
-              <a:t>*</a:t>
-            </a:r>
-            <a:endParaRPr lang="en-SG" sz="1100" dirty="0">
-              <a:solidFill>
-                <a:srgbClr val="7030A0"/>
-              </a:solidFill>
-            </a:endParaRPr>
-          </a:p>
-        </p:txBody>
-      </p:sp>
-      <p:sp>
-        <p:nvSpPr>
-          <p:cNvPr id="178" name="TextBox 177">
-            <a:extLst>
-              <a:ext uri="{FF2B5EF4-FFF2-40B4-BE49-F238E27FC236}">
-                <a16:creationId xmlns:a16="http://schemas.microsoft.com/office/drawing/2014/main" id="{81FCDF07-B86C-4928-80D9-3CFFC406F262}"/>
-              </a:ext>
-            </a:extLst>
-          </p:cNvPr>
-          <p:cNvSpPr txBox="1"/>
-          <p:nvPr/>
-        </p:nvSpPr>
-        <p:spPr>
-          <a:xfrm>
-            <a:off x="4331676" y="3998685"/>
+            <a:off x="5086565" y="1587241"/>
             <a:ext cx="189257" cy="178683"/>
           </a:xfrm>
           <a:prstGeom prst="rect">
@@ -7759,6 +7962,208 @@
           </a:p>
         </p:txBody>
       </p:sp>
+      <p:sp>
+        <p:nvSpPr>
+          <p:cNvPr id="424" name="TextBox 423">
+            <a:extLst>
+              <a:ext uri="{FF2B5EF4-FFF2-40B4-BE49-F238E27FC236}">
+                <a16:creationId xmlns:a16="http://schemas.microsoft.com/office/drawing/2014/main" id="{63BC37FA-B9BE-4257-BC36-AD26CFA78DE0}"/>
+              </a:ext>
+            </a:extLst>
+          </p:cNvPr>
+          <p:cNvSpPr txBox="1"/>
+          <p:nvPr/>
+        </p:nvSpPr>
+        <p:spPr>
+          <a:xfrm>
+            <a:off x="4606957" y="1597293"/>
+            <a:ext cx="189257" cy="178683"/>
+          </a:xfrm>
+          <a:prstGeom prst="rect">
+            <a:avLst/>
+          </a:prstGeom>
+          <a:noFill/>
+        </p:spPr>
+        <p:txBody>
+          <a:bodyPr wrap="square" lIns="0" tIns="0" rIns="0" bIns="0" rtlCol="0">
+            <a:noAutofit/>
+          </a:bodyPr>
+          <a:lstStyle/>
+          <a:p>
+            <a:pPr algn="ctr"/>
+            <a:r>
+              <a:rPr lang="en-US" sz="1100" dirty="0">
+                <a:solidFill>
+                  <a:srgbClr val="7030A0"/>
+                </a:solidFill>
+              </a:rPr>
+              <a:t>1</a:t>
+            </a:r>
+            <a:endParaRPr lang="en-SG" sz="1100" dirty="0">
+              <a:solidFill>
+                <a:srgbClr val="7030A0"/>
+              </a:solidFill>
+            </a:endParaRPr>
+          </a:p>
+        </p:txBody>
+      </p:sp>
+      <p:sp>
+        <p:nvSpPr>
+          <p:cNvPr id="425" name="TextBox 424">
+            <a:extLst>
+              <a:ext uri="{FF2B5EF4-FFF2-40B4-BE49-F238E27FC236}">
+                <a16:creationId xmlns:a16="http://schemas.microsoft.com/office/drawing/2014/main" id="{14E39658-9226-483B-81A5-1641706EF205}"/>
+              </a:ext>
+            </a:extLst>
+          </p:cNvPr>
+          <p:cNvSpPr txBox="1"/>
+          <p:nvPr/>
+        </p:nvSpPr>
+        <p:spPr>
+          <a:xfrm>
+            <a:off x="5678462" y="2990223"/>
+            <a:ext cx="189257" cy="178683"/>
+          </a:xfrm>
+          <a:prstGeom prst="rect">
+            <a:avLst/>
+          </a:prstGeom>
+          <a:noFill/>
+        </p:spPr>
+        <p:txBody>
+          <a:bodyPr wrap="square" lIns="0" tIns="0" rIns="0" bIns="0" rtlCol="0">
+            <a:noAutofit/>
+          </a:bodyPr>
+          <a:lstStyle/>
+          <a:p>
+            <a:pPr algn="ctr"/>
+            <a:r>
+              <a:rPr lang="en-US" sz="1100" dirty="0">
+                <a:solidFill>
+                  <a:srgbClr val="7030A0"/>
+                </a:solidFill>
+              </a:rPr>
+              <a:t>1</a:t>
+            </a:r>
+            <a:endParaRPr lang="en-SG" sz="1100" dirty="0">
+              <a:solidFill>
+                <a:srgbClr val="7030A0"/>
+              </a:solidFill>
+            </a:endParaRPr>
+          </a:p>
+        </p:txBody>
+      </p:sp>
+      <p:sp>
+        <p:nvSpPr>
+          <p:cNvPr id="427" name="Rectangle 8">
+            <a:extLst>
+              <a:ext uri="{FF2B5EF4-FFF2-40B4-BE49-F238E27FC236}">
+                <a16:creationId xmlns:a16="http://schemas.microsoft.com/office/drawing/2014/main" id="{1C8505D6-0A24-4BE9-8F0A-7566016F68AB}"/>
+              </a:ext>
+            </a:extLst>
+          </p:cNvPr>
+          <p:cNvSpPr/>
+          <p:nvPr/>
+        </p:nvSpPr>
+        <p:spPr>
+          <a:xfrm>
+            <a:off x="7004453" y="1006830"/>
+            <a:ext cx="708186" cy="285783"/>
+          </a:xfrm>
+          <a:prstGeom prst="rect">
+            <a:avLst/>
+          </a:prstGeom>
+          <a:ln w="19050">
+            <a:solidFill>
+              <a:srgbClr val="7030A0"/>
+            </a:solidFill>
+          </a:ln>
+          <a:effectLst/>
+        </p:spPr>
+        <p:style>
+          <a:lnRef idx="1">
+            <a:schemeClr val="accent4"/>
+          </a:lnRef>
+          <a:fillRef idx="2">
+            <a:schemeClr val="accent4"/>
+          </a:fillRef>
+          <a:effectRef idx="1">
+            <a:schemeClr val="accent4"/>
+          </a:effectRef>
+          <a:fontRef idx="minor">
+            <a:schemeClr val="dk1"/>
+          </a:fontRef>
+        </p:style>
+        <p:txBody>
+          <a:bodyPr rtlCol="0" anchor="ctr"/>
+          <a:lstStyle/>
+          <a:p>
+            <a:pPr algn="ctr"/>
+            <a:r>
+              <a:rPr lang="en-US" sz="1050" dirty="0">
+                <a:solidFill>
+                  <a:srgbClr val="7030A0"/>
+                </a:solidFill>
+              </a:rPr>
+              <a:t>Salary</a:t>
+            </a:r>
+            <a:endParaRPr lang="en-SG" sz="1050" dirty="0">
+              <a:solidFill>
+                <a:srgbClr val="7030A0"/>
+              </a:solidFill>
+            </a:endParaRPr>
+          </a:p>
+        </p:txBody>
+      </p:sp>
+      <p:cxnSp>
+        <p:nvCxnSpPr>
+          <p:cNvPr id="429" name="Elbow Connector 78">
+            <a:extLst>
+              <a:ext uri="{FF2B5EF4-FFF2-40B4-BE49-F238E27FC236}">
+                <a16:creationId xmlns:a16="http://schemas.microsoft.com/office/drawing/2014/main" id="{B31DF280-5650-4DC3-AE6E-8599C10C3A38}"/>
+              </a:ext>
+            </a:extLst>
+          </p:cNvPr>
+          <p:cNvCxnSpPr>
+            <a:cxnSpLocks/>
+            <a:stCxn id="78" idx="3"/>
+            <a:endCxn id="427" idx="1"/>
+          </p:cNvCxnSpPr>
+          <p:nvPr/>
+        </p:nvCxnSpPr>
+        <p:spPr>
+          <a:xfrm flipV="1">
+            <a:off x="6628716" y="1149722"/>
+            <a:ext cx="375737" cy="289438"/>
+          </a:xfrm>
+          <a:prstGeom prst="bentConnector3">
+            <a:avLst>
+              <a:gd name="adj1" fmla="val 50000"/>
+            </a:avLst>
+          </a:prstGeom>
+          <a:ln w="19050">
+            <a:solidFill>
+              <a:srgbClr val="7030A0"/>
+            </a:solidFill>
+            <a:headEnd type="none" w="med" len="med"/>
+            <a:tailEnd type="arrow" w="med" len="med"/>
+          </a:ln>
+          <a:effectLst/>
+        </p:spPr>
+        <p:style>
+          <a:lnRef idx="1">
+            <a:schemeClr val="accent2"/>
+          </a:lnRef>
+          <a:fillRef idx="2">
+            <a:schemeClr val="accent2"/>
+          </a:fillRef>
+          <a:effectRef idx="1">
+            <a:schemeClr val="accent2"/>
+          </a:effectRef>
+          <a:fontRef idx="minor">
+            <a:schemeClr val="dk1"/>
+          </a:fontRef>
+        </p:style>
+      </p:cxnSp>
     </p:spTree>
     <p:extLst>
       <p:ext uri="{BB962C8B-B14F-4D97-AF65-F5344CB8AC3E}">

</xml_diff>